<commit_message>
Slide updates for presentation.
git-svn-id: https://svn.alphora.com:8443/svn/Fastore/trunk@500 b30075cd-70d6-584e-9a73-6433d0c45435
</commit_message>
<xml_diff>
--- a/Documents/Fastore Architectural Overview - Aug 16.pptx
+++ b/Documents/Fastore Architectural Overview - Aug 16.pptx
@@ -503,7 +503,7 @@
           <a:p>
             <a:fld id="{4036C739-1928-4FEE-A524-C66857305C79}" type="datetimeFigureOut">
               <a:rPr lang="en-US" smtClean="0"/>
-              <a:t>8/16/2012</a:t>
+              <a:t>8/22/2012</a:t>
             </a:fld>
             <a:endParaRPr lang="en-US"/>
           </a:p>
@@ -668,7 +668,7 @@
           <a:p>
             <a:fld id="{4036C739-1928-4FEE-A524-C66857305C79}" type="datetimeFigureOut">
               <a:rPr lang="en-US" smtClean="0"/>
-              <a:t>8/16/2012</a:t>
+              <a:t>8/22/2012</a:t>
             </a:fld>
             <a:endParaRPr lang="en-US"/>
           </a:p>
@@ -843,7 +843,7 @@
           <a:p>
             <a:fld id="{4036C739-1928-4FEE-A524-C66857305C79}" type="datetimeFigureOut">
               <a:rPr lang="en-US" smtClean="0"/>
-              <a:t>8/16/2012</a:t>
+              <a:t>8/22/2012</a:t>
             </a:fld>
             <a:endParaRPr lang="en-US"/>
           </a:p>
@@ -1012,7 +1012,7 @@
           <a:p>
             <a:fld id="{4036C739-1928-4FEE-A524-C66857305C79}" type="datetimeFigureOut">
               <a:rPr lang="en-US" smtClean="0"/>
-              <a:t>8/16/2012</a:t>
+              <a:t>8/22/2012</a:t>
             </a:fld>
             <a:endParaRPr lang="en-US"/>
           </a:p>
@@ -1467,7 +1467,7 @@
           <a:p>
             <a:fld id="{4036C739-1928-4FEE-A524-C66857305C79}" type="datetimeFigureOut">
               <a:rPr lang="en-US" smtClean="0"/>
-              <a:t>8/16/2012</a:t>
+              <a:t>8/22/2012</a:t>
             </a:fld>
             <a:endParaRPr lang="en-US"/>
           </a:p>
@@ -1731,7 +1731,7 @@
           <a:p>
             <a:fld id="{4036C739-1928-4FEE-A524-C66857305C79}" type="datetimeFigureOut">
               <a:rPr lang="en-US" smtClean="0"/>
-              <a:t>8/16/2012</a:t>
+              <a:t>8/22/2012</a:t>
             </a:fld>
             <a:endParaRPr lang="en-US"/>
           </a:p>
@@ -2105,7 +2105,7 @@
           <a:p>
             <a:fld id="{4036C739-1928-4FEE-A524-C66857305C79}" type="datetimeFigureOut">
               <a:rPr lang="en-US" smtClean="0"/>
-              <a:t>8/16/2012</a:t>
+              <a:t>8/22/2012</a:t>
             </a:fld>
             <a:endParaRPr lang="en-US"/>
           </a:p>
@@ -2227,7 +2227,7 @@
           <a:p>
             <a:fld id="{4036C739-1928-4FEE-A524-C66857305C79}" type="datetimeFigureOut">
               <a:rPr lang="en-US" smtClean="0"/>
-              <a:t>8/16/2012</a:t>
+              <a:t>8/22/2012</a:t>
             </a:fld>
             <a:endParaRPr lang="en-US"/>
           </a:p>
@@ -2317,7 +2317,7 @@
           <a:p>
             <a:fld id="{4036C739-1928-4FEE-A524-C66857305C79}" type="datetimeFigureOut">
               <a:rPr lang="en-US" smtClean="0"/>
-              <a:t>8/16/2012</a:t>
+              <a:t>8/22/2012</a:t>
             </a:fld>
             <a:endParaRPr lang="en-US"/>
           </a:p>
@@ -2566,7 +2566,7 @@
           <a:p>
             <a:fld id="{4036C739-1928-4FEE-A524-C66857305C79}" type="datetimeFigureOut">
               <a:rPr lang="en-US" smtClean="0"/>
-              <a:t>8/16/2012</a:t>
+              <a:t>8/22/2012</a:t>
             </a:fld>
             <a:endParaRPr lang="en-US"/>
           </a:p>
@@ -2825,7 +2825,7 @@
           <a:p>
             <a:fld id="{4036C739-1928-4FEE-A524-C66857305C79}" type="datetimeFigureOut">
               <a:rPr lang="en-US" smtClean="0"/>
-              <a:t>8/16/2012</a:t>
+              <a:t>8/22/2012</a:t>
             </a:fld>
             <a:endParaRPr lang="en-US"/>
           </a:p>
@@ -3229,7 +3229,7 @@
           <a:p>
             <a:fld id="{4036C739-1928-4FEE-A524-C66857305C79}" type="datetimeFigureOut">
               <a:rPr lang="en-US" smtClean="0"/>
-              <a:t>8/16/2012</a:t>
+              <a:t>8/22/2012</a:t>
             </a:fld>
             <a:endParaRPr lang="en-US"/>
           </a:p>
@@ -3759,15 +3759,7 @@
           <a:p>
             <a:r>
               <a:rPr lang="en-US" dirty="0" smtClean="0"/>
-              <a:t>Code: Portable, </a:t>
-            </a:r>
-            <a:r>
-              <a:rPr lang="en-US" dirty="0" smtClean="0"/>
-              <a:t>C</a:t>
-            </a:r>
-            <a:r>
-              <a:rPr lang="en-US" dirty="0" smtClean="0"/>
-              <a:t>++</a:t>
+              <a:t>Code: Portable, C++</a:t>
             </a:r>
             <a:endParaRPr lang="en-US" dirty="0"/>
           </a:p>
@@ -3776,7 +3768,6 @@
               <a:rPr lang="en-US" dirty="0" smtClean="0"/>
               <a:t>Working set: ~700K overhead</a:t>
             </a:r>
-            <a:endParaRPr lang="en-US" dirty="0" smtClean="0"/>
           </a:p>
           <a:p>
             <a:r>
@@ -3789,14 +3780,12 @@
               <a:rPr lang="en-US" dirty="0" smtClean="0"/>
               <a:t>Libraries: Boost</a:t>
             </a:r>
-            <a:endParaRPr lang="en-US" dirty="0" smtClean="0"/>
           </a:p>
           <a:p>
             <a:r>
               <a:rPr lang="en-US" dirty="0" smtClean="0"/>
               <a:t>Query Processor: SQLite engine</a:t>
             </a:r>
-            <a:endParaRPr lang="en-US" dirty="0" smtClean="0"/>
           </a:p>
           <a:p>
             <a:r>
@@ -3809,7 +3798,6 @@
               <a:rPr lang="en-US" dirty="0" smtClean="0"/>
               <a:t>APIs: C, C++, Java, .NET (C#)</a:t>
             </a:r>
-            <a:endParaRPr lang="en-US" dirty="0" smtClean="0"/>
           </a:p>
         </p:txBody>
       </p:sp>
@@ -3890,23 +3878,31 @@
           <a:p>
             <a:r>
               <a:rPr lang="en-US" dirty="0" smtClean="0"/>
-              <a:t>Potentially</a:t>
+              <a:t>Not designed for BLOB data (presently)</a:t>
+            </a:r>
+          </a:p>
+          <a:p>
+            <a:r>
+              <a:rPr lang="en-US" dirty="0" smtClean="0"/>
+              <a:t>M</a:t>
             </a:r>
             <a:r>
               <a:rPr lang="en-US" baseline="0" dirty="0" smtClean="0"/>
-              <a:t> large memory investment</a:t>
-            </a:r>
-          </a:p>
-          <a:p>
+              <a:t>emory </a:t>
+            </a:r>
             <a:r>
               <a:rPr lang="en-US" baseline="0" dirty="0" smtClean="0"/>
-              <a:t>Must tune the CPU / memory ratio</a:t>
-            </a:r>
-          </a:p>
-          <a:p>
+              <a:t>investment</a:t>
+            </a:r>
+          </a:p>
+          <a:p>
+            <a:r>
+              <a:rPr lang="en-US" baseline="0" smtClean="0"/>
+              <a:t>Minimal </a:t>
+            </a:r>
             <a:r>
               <a:rPr lang="en-US" baseline="0" dirty="0" smtClean="0"/>
-              <a:t>Minimal SQL</a:t>
+              <a:t>SQL</a:t>
             </a:r>
             <a:r>
               <a:rPr lang="en-US" dirty="0" smtClean="0"/>
@@ -4040,14 +4036,12 @@
               <a:rPr lang="en-US" dirty="0" smtClean="0"/>
               <a:t>Minimizes denormalization cases</a:t>
             </a:r>
-            <a:endParaRPr lang="en-US" dirty="0" smtClean="0"/>
           </a:p>
           <a:p>
             <a:r>
               <a:rPr lang="en-US" dirty="0" smtClean="0"/>
               <a:t>Familiar SQL and API interfaces</a:t>
             </a:r>
-            <a:endParaRPr lang="en-US" dirty="0" smtClean="0"/>
           </a:p>
         </p:txBody>
       </p:sp>
@@ -4449,13 +4443,8 @@
           <a:p>
             <a:r>
               <a:rPr lang="en-US" dirty="0" smtClean="0"/>
-              <a:t>C++ </a:t>
-            </a:r>
-            <a:r>
-              <a:rPr lang="en-US" dirty="0" smtClean="0"/>
-              <a:t>services and clients</a:t>
-            </a:r>
-            <a:endParaRPr lang="en-US" dirty="0" smtClean="0"/>
+              <a:t>C++ services and clients</a:t>
+            </a:r>
           </a:p>
         </p:txBody>
       </p:sp>
@@ -4747,11 +4736,7 @@
           <a:p>
             <a:r>
               <a:rPr lang="en-US" dirty="0" smtClean="0"/>
-              <a:t>Consistent disk </a:t>
-            </a:r>
-            <a:r>
-              <a:rPr lang="en-US" dirty="0" smtClean="0"/>
-              <a:t>model</a:t>
+              <a:t>Consistent disk model</a:t>
             </a:r>
           </a:p>
           <a:p>
@@ -4759,7 +4744,6 @@
               <a:rPr lang="en-US" dirty="0" smtClean="0"/>
               <a:t>Isolation via revisions</a:t>
             </a:r>
-            <a:endParaRPr lang="en-US" dirty="0" smtClean="0"/>
           </a:p>
           <a:p>
             <a:r>
@@ -4881,15 +4865,7 @@
           <a:p>
             <a:r>
               <a:rPr lang="en-US" dirty="0" smtClean="0"/>
-              <a:t>Pessimistic – explicit locking for </a:t>
-            </a:r>
-            <a:r>
-              <a:rPr lang="en-US" dirty="0" smtClean="0"/>
-              <a:t>high contention </a:t>
-            </a:r>
-            <a:r>
-              <a:rPr lang="en-US" dirty="0" smtClean="0"/>
-              <a:t>points</a:t>
+              <a:t>Pessimistic – explicit locking for high contention points</a:t>
             </a:r>
             <a:endParaRPr lang="en-US" dirty="0"/>
           </a:p>
@@ -4998,11 +4974,7 @@
           <a:p>
             <a:r>
               <a:rPr lang="en-US" dirty="0" smtClean="0"/>
-              <a:t>Client coordinates </a:t>
-            </a:r>
-            <a:r>
-              <a:rPr lang="en-US" dirty="0" smtClean="0"/>
-              <a:t>transactions</a:t>
+              <a:t>Client coordinates transactions</a:t>
             </a:r>
           </a:p>
           <a:p>

</xml_diff>